<commit_message>
Added material for Blinn Phong
</commit_message>
<xml_diff>
--- a/COMP220/06/diagrams.pptx
+++ b/COMP220/06/diagrams.pptx
@@ -109,7 +109,16 @@
       </a:defRPr>
     </a:lvl9pPr>
   </p:defaultTextStyle>
+  <p:extLst>
+    <p:ext uri="{EFAFB233-063F-42B5-8137-9DF3F51BA10A}">
+      <p15:sldGuideLst xmlns:p15="http://schemas.microsoft.com/office/powerpoint/2012/main"/>
+    </p:ext>
+  </p:extLst>
 </p:presentation>
+</file>
+
+<file path=ppt/revisionInfo.xml><?xml version="1.0" encoding="utf-8"?>
+<p1510:revInfo xmlns:a="http://schemas.openxmlformats.org/drawingml/2006/main" xmlns:r="http://schemas.openxmlformats.org/officeDocument/2006/relationships" xmlns:p1510="http://schemas.microsoft.com/office/powerpoint/2015/10/main"/>
 </file>
 
 <file path=ppt/slideLayouts/slideLayout1.xml><?xml version="1.0" encoding="utf-8"?>
@@ -154,7 +163,7 @@
           </a:lstStyle>
           <a:p>
             <a:r>
-              <a:rPr lang="en-US" smtClean="0"/>
+              <a:rPr lang="en-US"/>
               <a:t>Click to edit Master title style</a:t>
             </a:r>
             <a:endParaRPr lang="en-GB"/>
@@ -219,7 +228,7 @@
           </a:lstStyle>
           <a:p>
             <a:r>
-              <a:rPr lang="en-US" smtClean="0"/>
+              <a:rPr lang="en-US"/>
               <a:t>Click to edit Master subtitle style</a:t>
             </a:r>
             <a:endParaRPr lang="en-GB"/>
@@ -243,7 +252,7 @@
           <a:p>
             <a:fld id="{142FDCEA-43C2-48DF-9458-58BC755CEFE0}" type="datetimeFigureOut">
               <a:rPr lang="en-GB" smtClean="0"/>
-              <a:t>24/10/2016</a:t>
+              <a:t>05/11/2017</a:t>
             </a:fld>
             <a:endParaRPr lang="en-GB"/>
           </a:p>
@@ -337,7 +346,7 @@
           <a:lstStyle/>
           <a:p>
             <a:r>
-              <a:rPr lang="en-US" smtClean="0"/>
+              <a:rPr lang="en-US"/>
               <a:t>Click to edit Master title style</a:t>
             </a:r>
             <a:endParaRPr lang="en-GB"/>
@@ -361,35 +370,35 @@
           <a:p>
             <a:pPr lvl="0"/>
             <a:r>
-              <a:rPr lang="en-US" smtClean="0"/>
+              <a:rPr lang="en-US"/>
               <a:t>Click to edit Master text styles</a:t>
             </a:r>
           </a:p>
           <a:p>
             <a:pPr lvl="1"/>
             <a:r>
-              <a:rPr lang="en-US" smtClean="0"/>
+              <a:rPr lang="en-US"/>
               <a:t>Second level</a:t>
             </a:r>
           </a:p>
           <a:p>
             <a:pPr lvl="2"/>
             <a:r>
-              <a:rPr lang="en-US" smtClean="0"/>
+              <a:rPr lang="en-US"/>
               <a:t>Third level</a:t>
             </a:r>
           </a:p>
           <a:p>
             <a:pPr lvl="3"/>
             <a:r>
-              <a:rPr lang="en-US" smtClean="0"/>
+              <a:rPr lang="en-US"/>
               <a:t>Fourth level</a:t>
             </a:r>
           </a:p>
           <a:p>
             <a:pPr lvl="4"/>
             <a:r>
-              <a:rPr lang="en-US" smtClean="0"/>
+              <a:rPr lang="en-US"/>
               <a:t>Fifth level</a:t>
             </a:r>
             <a:endParaRPr lang="en-GB"/>
@@ -413,7 +422,7 @@
           <a:p>
             <a:fld id="{142FDCEA-43C2-48DF-9458-58BC755CEFE0}" type="datetimeFigureOut">
               <a:rPr lang="en-GB" smtClean="0"/>
-              <a:t>24/10/2016</a:t>
+              <a:t>05/11/2017</a:t>
             </a:fld>
             <a:endParaRPr lang="en-GB"/>
           </a:p>
@@ -512,7 +521,7 @@
           <a:lstStyle/>
           <a:p>
             <a:r>
-              <a:rPr lang="en-US" smtClean="0"/>
+              <a:rPr lang="en-US"/>
               <a:t>Click to edit Master title style</a:t>
             </a:r>
             <a:endParaRPr lang="en-GB"/>
@@ -541,35 +550,35 @@
           <a:p>
             <a:pPr lvl="0"/>
             <a:r>
-              <a:rPr lang="en-US" smtClean="0"/>
+              <a:rPr lang="en-US"/>
               <a:t>Click to edit Master text styles</a:t>
             </a:r>
           </a:p>
           <a:p>
             <a:pPr lvl="1"/>
             <a:r>
-              <a:rPr lang="en-US" smtClean="0"/>
+              <a:rPr lang="en-US"/>
               <a:t>Second level</a:t>
             </a:r>
           </a:p>
           <a:p>
             <a:pPr lvl="2"/>
             <a:r>
-              <a:rPr lang="en-US" smtClean="0"/>
+              <a:rPr lang="en-US"/>
               <a:t>Third level</a:t>
             </a:r>
           </a:p>
           <a:p>
             <a:pPr lvl="3"/>
             <a:r>
-              <a:rPr lang="en-US" smtClean="0"/>
+              <a:rPr lang="en-US"/>
               <a:t>Fourth level</a:t>
             </a:r>
           </a:p>
           <a:p>
             <a:pPr lvl="4"/>
             <a:r>
-              <a:rPr lang="en-US" smtClean="0"/>
+              <a:rPr lang="en-US"/>
               <a:t>Fifth level</a:t>
             </a:r>
             <a:endParaRPr lang="en-GB"/>
@@ -593,7 +602,7 @@
           <a:p>
             <a:fld id="{142FDCEA-43C2-48DF-9458-58BC755CEFE0}" type="datetimeFigureOut">
               <a:rPr lang="en-GB" smtClean="0"/>
-              <a:t>24/10/2016</a:t>
+              <a:t>05/11/2017</a:t>
             </a:fld>
             <a:endParaRPr lang="en-GB"/>
           </a:p>
@@ -687,7 +696,7 @@
           <a:lstStyle/>
           <a:p>
             <a:r>
-              <a:rPr lang="en-US" smtClean="0"/>
+              <a:rPr lang="en-US"/>
               <a:t>Click to edit Master title style</a:t>
             </a:r>
             <a:endParaRPr lang="en-GB"/>
@@ -711,35 +720,35 @@
           <a:p>
             <a:pPr lvl="0"/>
             <a:r>
-              <a:rPr lang="en-US" smtClean="0"/>
+              <a:rPr lang="en-US"/>
               <a:t>Click to edit Master text styles</a:t>
             </a:r>
           </a:p>
           <a:p>
             <a:pPr lvl="1"/>
             <a:r>
-              <a:rPr lang="en-US" smtClean="0"/>
+              <a:rPr lang="en-US"/>
               <a:t>Second level</a:t>
             </a:r>
           </a:p>
           <a:p>
             <a:pPr lvl="2"/>
             <a:r>
-              <a:rPr lang="en-US" smtClean="0"/>
+              <a:rPr lang="en-US"/>
               <a:t>Third level</a:t>
             </a:r>
           </a:p>
           <a:p>
             <a:pPr lvl="3"/>
             <a:r>
-              <a:rPr lang="en-US" smtClean="0"/>
+              <a:rPr lang="en-US"/>
               <a:t>Fourth level</a:t>
             </a:r>
           </a:p>
           <a:p>
             <a:pPr lvl="4"/>
             <a:r>
-              <a:rPr lang="en-US" smtClean="0"/>
+              <a:rPr lang="en-US"/>
               <a:t>Fifth level</a:t>
             </a:r>
             <a:endParaRPr lang="en-GB"/>
@@ -763,7 +772,7 @@
           <a:p>
             <a:fld id="{142FDCEA-43C2-48DF-9458-58BC755CEFE0}" type="datetimeFigureOut">
               <a:rPr lang="en-GB" smtClean="0"/>
-              <a:t>24/10/2016</a:t>
+              <a:t>05/11/2017</a:t>
             </a:fld>
             <a:endParaRPr lang="en-GB"/>
           </a:p>
@@ -866,7 +875,7 @@
           </a:lstStyle>
           <a:p>
             <a:r>
-              <a:rPr lang="en-US" smtClean="0"/>
+              <a:rPr lang="en-US"/>
               <a:t>Click to edit Master title style</a:t>
             </a:r>
             <a:endParaRPr lang="en-GB"/>
@@ -986,7 +995,7 @@
           <a:p>
             <a:pPr lvl="0"/>
             <a:r>
-              <a:rPr lang="en-US" smtClean="0"/>
+              <a:rPr lang="en-US"/>
               <a:t>Click to edit Master text styles</a:t>
             </a:r>
           </a:p>
@@ -1009,7 +1018,7 @@
           <a:p>
             <a:fld id="{142FDCEA-43C2-48DF-9458-58BC755CEFE0}" type="datetimeFigureOut">
               <a:rPr lang="en-GB" smtClean="0"/>
-              <a:t>24/10/2016</a:t>
+              <a:t>05/11/2017</a:t>
             </a:fld>
             <a:endParaRPr lang="en-GB"/>
           </a:p>
@@ -1103,7 +1112,7 @@
           <a:lstStyle/>
           <a:p>
             <a:r>
-              <a:rPr lang="en-US" smtClean="0"/>
+              <a:rPr lang="en-US"/>
               <a:t>Click to edit Master title style</a:t>
             </a:r>
             <a:endParaRPr lang="en-GB"/>
@@ -1132,35 +1141,35 @@
           <a:p>
             <a:pPr lvl="0"/>
             <a:r>
-              <a:rPr lang="en-US" smtClean="0"/>
+              <a:rPr lang="en-US"/>
               <a:t>Click to edit Master text styles</a:t>
             </a:r>
           </a:p>
           <a:p>
             <a:pPr lvl="1"/>
             <a:r>
-              <a:rPr lang="en-US" smtClean="0"/>
+              <a:rPr lang="en-US"/>
               <a:t>Second level</a:t>
             </a:r>
           </a:p>
           <a:p>
             <a:pPr lvl="2"/>
             <a:r>
-              <a:rPr lang="en-US" smtClean="0"/>
+              <a:rPr lang="en-US"/>
               <a:t>Third level</a:t>
             </a:r>
           </a:p>
           <a:p>
             <a:pPr lvl="3"/>
             <a:r>
-              <a:rPr lang="en-US" smtClean="0"/>
+              <a:rPr lang="en-US"/>
               <a:t>Fourth level</a:t>
             </a:r>
           </a:p>
           <a:p>
             <a:pPr lvl="4"/>
             <a:r>
-              <a:rPr lang="en-US" smtClean="0"/>
+              <a:rPr lang="en-US"/>
               <a:t>Fifth level</a:t>
             </a:r>
             <a:endParaRPr lang="en-GB"/>
@@ -1189,35 +1198,35 @@
           <a:p>
             <a:pPr lvl="0"/>
             <a:r>
-              <a:rPr lang="en-US" smtClean="0"/>
+              <a:rPr lang="en-US"/>
               <a:t>Click to edit Master text styles</a:t>
             </a:r>
           </a:p>
           <a:p>
             <a:pPr lvl="1"/>
             <a:r>
-              <a:rPr lang="en-US" smtClean="0"/>
+              <a:rPr lang="en-US"/>
               <a:t>Second level</a:t>
             </a:r>
           </a:p>
           <a:p>
             <a:pPr lvl="2"/>
             <a:r>
-              <a:rPr lang="en-US" smtClean="0"/>
+              <a:rPr lang="en-US"/>
               <a:t>Third level</a:t>
             </a:r>
           </a:p>
           <a:p>
             <a:pPr lvl="3"/>
             <a:r>
-              <a:rPr lang="en-US" smtClean="0"/>
+              <a:rPr lang="en-US"/>
               <a:t>Fourth level</a:t>
             </a:r>
           </a:p>
           <a:p>
             <a:pPr lvl="4"/>
             <a:r>
-              <a:rPr lang="en-US" smtClean="0"/>
+              <a:rPr lang="en-US"/>
               <a:t>Fifth level</a:t>
             </a:r>
             <a:endParaRPr lang="en-GB"/>
@@ -1241,7 +1250,7 @@
           <a:p>
             <a:fld id="{142FDCEA-43C2-48DF-9458-58BC755CEFE0}" type="datetimeFigureOut">
               <a:rPr lang="en-GB" smtClean="0"/>
-              <a:t>24/10/2016</a:t>
+              <a:t>05/11/2017</a:t>
             </a:fld>
             <a:endParaRPr lang="en-GB"/>
           </a:p>
@@ -1340,7 +1349,7 @@
           <a:lstStyle/>
           <a:p>
             <a:r>
-              <a:rPr lang="en-US" smtClean="0"/>
+              <a:rPr lang="en-US"/>
               <a:t>Click to edit Master title style</a:t>
             </a:r>
             <a:endParaRPr lang="en-GB"/>
@@ -1406,7 +1415,7 @@
           <a:p>
             <a:pPr lvl="0"/>
             <a:r>
-              <a:rPr lang="en-US" smtClean="0"/>
+              <a:rPr lang="en-US"/>
               <a:t>Click to edit Master text styles</a:t>
             </a:r>
           </a:p>
@@ -1434,35 +1443,35 @@
           <a:p>
             <a:pPr lvl="0"/>
             <a:r>
-              <a:rPr lang="en-US" smtClean="0"/>
+              <a:rPr lang="en-US"/>
               <a:t>Click to edit Master text styles</a:t>
             </a:r>
           </a:p>
           <a:p>
             <a:pPr lvl="1"/>
             <a:r>
-              <a:rPr lang="en-US" smtClean="0"/>
+              <a:rPr lang="en-US"/>
               <a:t>Second level</a:t>
             </a:r>
           </a:p>
           <a:p>
             <a:pPr lvl="2"/>
             <a:r>
-              <a:rPr lang="en-US" smtClean="0"/>
+              <a:rPr lang="en-US"/>
               <a:t>Third level</a:t>
             </a:r>
           </a:p>
           <a:p>
             <a:pPr lvl="3"/>
             <a:r>
-              <a:rPr lang="en-US" smtClean="0"/>
+              <a:rPr lang="en-US"/>
               <a:t>Fourth level</a:t>
             </a:r>
           </a:p>
           <a:p>
             <a:pPr lvl="4"/>
             <a:r>
-              <a:rPr lang="en-US" smtClean="0"/>
+              <a:rPr lang="en-US"/>
               <a:t>Fifth level</a:t>
             </a:r>
             <a:endParaRPr lang="en-GB"/>
@@ -1528,7 +1537,7 @@
           <a:p>
             <a:pPr lvl="0"/>
             <a:r>
-              <a:rPr lang="en-US" smtClean="0"/>
+              <a:rPr lang="en-US"/>
               <a:t>Click to edit Master text styles</a:t>
             </a:r>
           </a:p>
@@ -1556,35 +1565,35 @@
           <a:p>
             <a:pPr lvl="0"/>
             <a:r>
-              <a:rPr lang="en-US" smtClean="0"/>
+              <a:rPr lang="en-US"/>
               <a:t>Click to edit Master text styles</a:t>
             </a:r>
           </a:p>
           <a:p>
             <a:pPr lvl="1"/>
             <a:r>
-              <a:rPr lang="en-US" smtClean="0"/>
+              <a:rPr lang="en-US"/>
               <a:t>Second level</a:t>
             </a:r>
           </a:p>
           <a:p>
             <a:pPr lvl="2"/>
             <a:r>
-              <a:rPr lang="en-US" smtClean="0"/>
+              <a:rPr lang="en-US"/>
               <a:t>Third level</a:t>
             </a:r>
           </a:p>
           <a:p>
             <a:pPr lvl="3"/>
             <a:r>
-              <a:rPr lang="en-US" smtClean="0"/>
+              <a:rPr lang="en-US"/>
               <a:t>Fourth level</a:t>
             </a:r>
           </a:p>
           <a:p>
             <a:pPr lvl="4"/>
             <a:r>
-              <a:rPr lang="en-US" smtClean="0"/>
+              <a:rPr lang="en-US"/>
               <a:t>Fifth level</a:t>
             </a:r>
             <a:endParaRPr lang="en-GB"/>
@@ -1608,7 +1617,7 @@
           <a:p>
             <a:fld id="{142FDCEA-43C2-48DF-9458-58BC755CEFE0}" type="datetimeFigureOut">
               <a:rPr lang="en-GB" smtClean="0"/>
-              <a:t>24/10/2016</a:t>
+              <a:t>05/11/2017</a:t>
             </a:fld>
             <a:endParaRPr lang="en-GB"/>
           </a:p>
@@ -1702,7 +1711,7 @@
           <a:lstStyle/>
           <a:p>
             <a:r>
-              <a:rPr lang="en-US" smtClean="0"/>
+              <a:rPr lang="en-US"/>
               <a:t>Click to edit Master title style</a:t>
             </a:r>
             <a:endParaRPr lang="en-GB"/>
@@ -1726,7 +1735,7 @@
           <a:p>
             <a:fld id="{142FDCEA-43C2-48DF-9458-58BC755CEFE0}" type="datetimeFigureOut">
               <a:rPr lang="en-GB" smtClean="0"/>
-              <a:t>24/10/2016</a:t>
+              <a:t>05/11/2017</a:t>
             </a:fld>
             <a:endParaRPr lang="en-GB"/>
           </a:p>
@@ -1821,7 +1830,7 @@
           <a:p>
             <a:fld id="{142FDCEA-43C2-48DF-9458-58BC755CEFE0}" type="datetimeFigureOut">
               <a:rPr lang="en-GB" smtClean="0"/>
-              <a:t>24/10/2016</a:t>
+              <a:t>05/11/2017</a:t>
             </a:fld>
             <a:endParaRPr lang="en-GB"/>
           </a:p>
@@ -1924,7 +1933,7 @@
           </a:lstStyle>
           <a:p>
             <a:r>
-              <a:rPr lang="en-US" smtClean="0"/>
+              <a:rPr lang="en-US"/>
               <a:t>Click to edit Master title style</a:t>
             </a:r>
             <a:endParaRPr lang="en-GB"/>
@@ -1981,35 +1990,35 @@
           <a:p>
             <a:pPr lvl="0"/>
             <a:r>
-              <a:rPr lang="en-US" smtClean="0"/>
+              <a:rPr lang="en-US"/>
               <a:t>Click to edit Master text styles</a:t>
             </a:r>
           </a:p>
           <a:p>
             <a:pPr lvl="1"/>
             <a:r>
-              <a:rPr lang="en-US" smtClean="0"/>
+              <a:rPr lang="en-US"/>
               <a:t>Second level</a:t>
             </a:r>
           </a:p>
           <a:p>
             <a:pPr lvl="2"/>
             <a:r>
-              <a:rPr lang="en-US" smtClean="0"/>
+              <a:rPr lang="en-US"/>
               <a:t>Third level</a:t>
             </a:r>
           </a:p>
           <a:p>
             <a:pPr lvl="3"/>
             <a:r>
-              <a:rPr lang="en-US" smtClean="0"/>
+              <a:rPr lang="en-US"/>
               <a:t>Fourth level</a:t>
             </a:r>
           </a:p>
           <a:p>
             <a:pPr lvl="4"/>
             <a:r>
-              <a:rPr lang="en-US" smtClean="0"/>
+              <a:rPr lang="en-US"/>
               <a:t>Fifth level</a:t>
             </a:r>
             <a:endParaRPr lang="en-GB"/>
@@ -2075,7 +2084,7 @@
           <a:p>
             <a:pPr lvl="0"/>
             <a:r>
-              <a:rPr lang="en-US" smtClean="0"/>
+              <a:rPr lang="en-US"/>
               <a:t>Click to edit Master text styles</a:t>
             </a:r>
           </a:p>
@@ -2098,7 +2107,7 @@
           <a:p>
             <a:fld id="{142FDCEA-43C2-48DF-9458-58BC755CEFE0}" type="datetimeFigureOut">
               <a:rPr lang="en-GB" smtClean="0"/>
-              <a:t>24/10/2016</a:t>
+              <a:t>05/11/2017</a:t>
             </a:fld>
             <a:endParaRPr lang="en-GB"/>
           </a:p>
@@ -2201,7 +2210,7 @@
           </a:lstStyle>
           <a:p>
             <a:r>
-              <a:rPr lang="en-US" smtClean="0"/>
+              <a:rPr lang="en-US"/>
               <a:t>Click to edit Master title style</a:t>
             </a:r>
             <a:endParaRPr lang="en-GB"/>
@@ -2328,7 +2337,7 @@
           <a:p>
             <a:pPr lvl="0"/>
             <a:r>
-              <a:rPr lang="en-US" smtClean="0"/>
+              <a:rPr lang="en-US"/>
               <a:t>Click to edit Master text styles</a:t>
             </a:r>
           </a:p>
@@ -2351,7 +2360,7 @@
           <a:p>
             <a:fld id="{142FDCEA-43C2-48DF-9458-58BC755CEFE0}" type="datetimeFigureOut">
               <a:rPr lang="en-GB" smtClean="0"/>
-              <a:t>24/10/2016</a:t>
+              <a:t>05/11/2017</a:t>
             </a:fld>
             <a:endParaRPr lang="en-GB"/>
           </a:p>
@@ -2460,7 +2469,7 @@
           <a:lstStyle/>
           <a:p>
             <a:r>
-              <a:rPr lang="en-US" smtClean="0"/>
+              <a:rPr lang="en-US"/>
               <a:t>Click to edit Master title style</a:t>
             </a:r>
             <a:endParaRPr lang="en-GB"/>
@@ -2494,35 +2503,35 @@
           <a:p>
             <a:pPr lvl="0"/>
             <a:r>
-              <a:rPr lang="en-US" smtClean="0"/>
+              <a:rPr lang="en-US"/>
               <a:t>Click to edit Master text styles</a:t>
             </a:r>
           </a:p>
           <a:p>
             <a:pPr lvl="1"/>
             <a:r>
-              <a:rPr lang="en-US" smtClean="0"/>
+              <a:rPr lang="en-US"/>
               <a:t>Second level</a:t>
             </a:r>
           </a:p>
           <a:p>
             <a:pPr lvl="2"/>
             <a:r>
-              <a:rPr lang="en-US" smtClean="0"/>
+              <a:rPr lang="en-US"/>
               <a:t>Third level</a:t>
             </a:r>
           </a:p>
           <a:p>
             <a:pPr lvl="3"/>
             <a:r>
-              <a:rPr lang="en-US" smtClean="0"/>
+              <a:rPr lang="en-US"/>
               <a:t>Fourth level</a:t>
             </a:r>
           </a:p>
           <a:p>
             <a:pPr lvl="4"/>
             <a:r>
-              <a:rPr lang="en-US" smtClean="0"/>
+              <a:rPr lang="en-US"/>
               <a:t>Fifth level</a:t>
             </a:r>
             <a:endParaRPr lang="en-GB"/>
@@ -2564,7 +2573,7 @@
           <a:p>
             <a:fld id="{142FDCEA-43C2-48DF-9458-58BC755CEFE0}" type="datetimeFigureOut">
               <a:rPr lang="en-GB" smtClean="0"/>
-              <a:t>24/10/2016</a:t>
+              <a:t>05/11/2017</a:t>
             </a:fld>
             <a:endParaRPr lang="en-GB"/>
           </a:p>
@@ -3042,10 +3051,9 @@
           <a:lstStyle/>
           <a:p>
             <a:r>
-              <a:rPr lang="en-GB" dirty="0" smtClean="0"/>
+              <a:rPr lang="en-GB" dirty="0"/>
               <a:t>a</a:t>
             </a:r>
-            <a:endParaRPr lang="en-GB" dirty="0"/>
           </a:p>
         </p:txBody>
       </p:sp>
@@ -3072,10 +3080,9 @@
           <a:lstStyle/>
           <a:p>
             <a:r>
-              <a:rPr lang="en-GB" dirty="0" smtClean="0"/>
+              <a:rPr lang="en-GB" dirty="0"/>
               <a:t>b</a:t>
             </a:r>
-            <a:endParaRPr lang="en-GB" dirty="0"/>
           </a:p>
         </p:txBody>
       </p:sp>
@@ -3102,10 +3109,9 @@
           <a:lstStyle/>
           <a:p>
             <a:r>
-              <a:rPr lang="en-GB" dirty="0" smtClean="0"/>
+              <a:rPr lang="en-GB" dirty="0"/>
               <a:t>c</a:t>
             </a:r>
-            <a:endParaRPr lang="en-GB" dirty="0"/>
           </a:p>
         </p:txBody>
       </p:sp>
@@ -3209,21 +3215,8 @@
                   <a:srgbClr val="FF0000"/>
                 </a:solidFill>
               </a:rPr>
-              <a:t>b</a:t>
-            </a:r>
-            <a:r>
-              <a:rPr lang="en-GB" dirty="0" smtClean="0">
-                <a:solidFill>
-                  <a:srgbClr val="FF0000"/>
-                </a:solidFill>
-              </a:rPr>
-              <a:t>-a</a:t>
-            </a:r>
-            <a:endParaRPr lang="en-GB" dirty="0">
-              <a:solidFill>
-                <a:srgbClr val="FF0000"/>
-              </a:solidFill>
-            </a:endParaRPr>
+              <a:t>b-a</a:t>
+            </a:r>
           </a:p>
         </p:txBody>
       </p:sp>
@@ -3250,18 +3243,13 @@
           <a:lstStyle/>
           <a:p>
             <a:r>
-              <a:rPr lang="en-GB" dirty="0" smtClean="0">
+              <a:rPr lang="en-GB" dirty="0">
                 <a:solidFill>
                   <a:srgbClr val="92D050"/>
                 </a:solidFill>
               </a:rPr>
               <a:t>c-a</a:t>
             </a:r>
-            <a:endParaRPr lang="en-GB" dirty="0">
-              <a:solidFill>
-                <a:srgbClr val="92D050"/>
-              </a:solidFill>
-            </a:endParaRPr>
           </a:p>
         </p:txBody>
       </p:sp>
@@ -3324,7 +3312,7 @@
           <a:lstStyle/>
           <a:p>
             <a:r>
-              <a:rPr lang="en-GB" dirty="0" smtClean="0">
+              <a:rPr lang="en-GB" dirty="0">
                 <a:solidFill>
                   <a:srgbClr val="FF0000"/>
                 </a:solidFill>
@@ -3332,7 +3320,7 @@
               <a:t>(b-a) </a:t>
             </a:r>
             <a:r>
-              <a:rPr lang="en-GB" dirty="0" smtClean="0">
+              <a:rPr lang="en-GB" dirty="0">
                 <a:solidFill>
                   <a:srgbClr val="7030A0"/>
                 </a:solidFill>
@@ -3340,7 +3328,7 @@
               <a:t>×</a:t>
             </a:r>
             <a:r>
-              <a:rPr lang="en-GB" dirty="0" smtClean="0">
+              <a:rPr lang="en-GB" dirty="0">
                 <a:solidFill>
                   <a:srgbClr val="FF0000"/>
                 </a:solidFill>
@@ -3348,18 +3336,13 @@
               <a:t> </a:t>
             </a:r>
             <a:r>
-              <a:rPr lang="en-GB" dirty="0" smtClean="0">
+              <a:rPr lang="en-GB" dirty="0">
                 <a:solidFill>
                   <a:srgbClr val="92D050"/>
                 </a:solidFill>
               </a:rPr>
               <a:t>(c-a)</a:t>
             </a:r>
-            <a:endParaRPr lang="en-GB" dirty="0">
-              <a:solidFill>
-                <a:srgbClr val="92D050"/>
-              </a:solidFill>
-            </a:endParaRPr>
           </a:p>
         </p:txBody>
       </p:sp>
@@ -4474,7 +4457,7 @@
           <a:lstStyle/>
           <a:p>
             <a:r>
-              <a:rPr lang="el-GR" dirty="0" smtClean="0"/>
+              <a:rPr lang="el-GR" dirty="0"/>
               <a:t>θ</a:t>
             </a:r>
             <a:endParaRPr lang="en-GB" dirty="0"/>
@@ -4507,7 +4490,6 @@
               <a:rPr lang="en-GB" dirty="0"/>
               <a:t>n</a:t>
             </a:r>
-            <a:endParaRPr lang="en-GB" dirty="0"/>
           </a:p>
         </p:txBody>
       </p:sp>
@@ -4534,7 +4516,7 @@
           <a:lstStyle/>
           <a:p>
             <a:r>
-              <a:rPr lang="en-GB" dirty="0" err="1" smtClean="0"/>
+              <a:rPr lang="en-GB" dirty="0" err="1"/>
               <a:t>i</a:t>
             </a:r>
             <a:endParaRPr lang="en-GB" dirty="0"/>
@@ -4794,7 +4776,7 @@
           <a:lstStyle/>
           <a:p>
             <a:r>
-              <a:rPr lang="el-GR" dirty="0" smtClean="0"/>
+              <a:rPr lang="el-GR" dirty="0"/>
               <a:t>θ</a:t>
             </a:r>
             <a:endParaRPr lang="en-GB" dirty="0"/>
@@ -4827,7 +4809,6 @@
               <a:rPr lang="en-GB" dirty="0"/>
               <a:t>n</a:t>
             </a:r>
-            <a:endParaRPr lang="en-GB" dirty="0"/>
           </a:p>
         </p:txBody>
       </p:sp>
@@ -4854,7 +4835,7 @@
           <a:lstStyle/>
           <a:p>
             <a:r>
-              <a:rPr lang="en-GB" dirty="0" err="1" smtClean="0"/>
+              <a:rPr lang="en-GB" dirty="0" err="1"/>
               <a:t>i</a:t>
             </a:r>
             <a:endParaRPr lang="en-GB" dirty="0"/>
@@ -4917,7 +4898,7 @@
           <a:lstStyle/>
           <a:p>
             <a:r>
-              <a:rPr lang="el-GR" dirty="0" smtClean="0"/>
+              <a:rPr lang="el-GR" dirty="0"/>
               <a:t>θ</a:t>
             </a:r>
             <a:endParaRPr lang="en-GB" dirty="0"/>
@@ -4933,7 +4914,7 @@
         <p:spPr>
           <a:xfrm>
             <a:off x="4800426" y="1558059"/>
-            <a:ext cx="264816" cy="369332"/>
+            <a:ext cx="306494" cy="369332"/>
           </a:xfrm>
           <a:prstGeom prst="rect">
             <a:avLst/>
@@ -4947,10 +4928,9 @@
           <a:lstStyle/>
           <a:p>
             <a:r>
-              <a:rPr lang="en-GB" dirty="0" err="1"/>
-              <a:t>r</a:t>
-            </a:r>
-            <a:endParaRPr lang="en-GB" dirty="0"/>
+              <a:rPr lang="en-GB" dirty="0"/>
+              <a:t>h</a:t>
+            </a:r>
           </a:p>
         </p:txBody>
       </p:sp>

</xml_diff>